<commit_message>
Banner as 1 image.
</commit_message>
<xml_diff>
--- a/dev/colors.pptx
+++ b/dev/colors.pptx
@@ -289,7 +289,7 @@
             <a:fld id="{119D44E4-7F07-9146-8A68-DFCA8BC98687}" type="datetimeFigureOut">
               <a:rPr lang="en-US" smtClean="0"/>
               <a:pPr/>
-              <a:t>3/9/11</a:t>
+              <a:t>11/18/11</a:t>
             </a:fld>
             <a:endParaRPr lang="en-US"/>
           </a:p>
@@ -456,7 +456,7 @@
             <a:fld id="{119D44E4-7F07-9146-8A68-DFCA8BC98687}" type="datetimeFigureOut">
               <a:rPr lang="en-US" smtClean="0"/>
               <a:pPr/>
-              <a:t>3/9/11</a:t>
+              <a:t>11/18/11</a:t>
             </a:fld>
             <a:endParaRPr lang="en-US"/>
           </a:p>
@@ -633,7 +633,7 @@
             <a:fld id="{119D44E4-7F07-9146-8A68-DFCA8BC98687}" type="datetimeFigureOut">
               <a:rPr lang="en-US" smtClean="0"/>
               <a:pPr/>
-              <a:t>3/9/11</a:t>
+              <a:t>11/18/11</a:t>
             </a:fld>
             <a:endParaRPr lang="en-US"/>
           </a:p>
@@ -800,7 +800,7 @@
             <a:fld id="{119D44E4-7F07-9146-8A68-DFCA8BC98687}" type="datetimeFigureOut">
               <a:rPr lang="en-US" smtClean="0"/>
               <a:pPr/>
-              <a:t>3/9/11</a:t>
+              <a:t>11/18/11</a:t>
             </a:fld>
             <a:endParaRPr lang="en-US"/>
           </a:p>
@@ -1043,7 +1043,7 @@
             <a:fld id="{119D44E4-7F07-9146-8A68-DFCA8BC98687}" type="datetimeFigureOut">
               <a:rPr lang="en-US" smtClean="0"/>
               <a:pPr/>
-              <a:t>3/9/11</a:t>
+              <a:t>11/18/11</a:t>
             </a:fld>
             <a:endParaRPr lang="en-US"/>
           </a:p>
@@ -1328,7 +1328,7 @@
             <a:fld id="{119D44E4-7F07-9146-8A68-DFCA8BC98687}" type="datetimeFigureOut">
               <a:rPr lang="en-US" smtClean="0"/>
               <a:pPr/>
-              <a:t>3/9/11</a:t>
+              <a:t>11/18/11</a:t>
             </a:fld>
             <a:endParaRPr lang="en-US"/>
           </a:p>
@@ -1747,7 +1747,7 @@
             <a:fld id="{119D44E4-7F07-9146-8A68-DFCA8BC98687}" type="datetimeFigureOut">
               <a:rPr lang="en-US" smtClean="0"/>
               <a:pPr/>
-              <a:t>3/9/11</a:t>
+              <a:t>11/18/11</a:t>
             </a:fld>
             <a:endParaRPr lang="en-US"/>
           </a:p>
@@ -1862,7 +1862,7 @@
             <a:fld id="{119D44E4-7F07-9146-8A68-DFCA8BC98687}" type="datetimeFigureOut">
               <a:rPr lang="en-US" smtClean="0"/>
               <a:pPr/>
-              <a:t>3/9/11</a:t>
+              <a:t>11/18/11</a:t>
             </a:fld>
             <a:endParaRPr lang="en-US"/>
           </a:p>
@@ -1954,7 +1954,7 @@
             <a:fld id="{119D44E4-7F07-9146-8A68-DFCA8BC98687}" type="datetimeFigureOut">
               <a:rPr lang="en-US" smtClean="0"/>
               <a:pPr/>
-              <a:t>3/9/11</a:t>
+              <a:t>11/18/11</a:t>
             </a:fld>
             <a:endParaRPr lang="en-US"/>
           </a:p>
@@ -2228,7 +2228,7 @@
             <a:fld id="{119D44E4-7F07-9146-8A68-DFCA8BC98687}" type="datetimeFigureOut">
               <a:rPr lang="en-US" smtClean="0"/>
               <a:pPr/>
-              <a:t>3/9/11</a:t>
+              <a:t>11/18/11</a:t>
             </a:fld>
             <a:endParaRPr lang="en-US"/>
           </a:p>
@@ -2478,7 +2478,7 @@
             <a:fld id="{119D44E4-7F07-9146-8A68-DFCA8BC98687}" type="datetimeFigureOut">
               <a:rPr lang="en-US" smtClean="0"/>
               <a:pPr/>
-              <a:t>3/9/11</a:t>
+              <a:t>11/18/11</a:t>
             </a:fld>
             <a:endParaRPr lang="en-US"/>
           </a:p>
@@ -2688,7 +2688,7 @@
             <a:fld id="{119D44E4-7F07-9146-8A68-DFCA8BC98687}" type="datetimeFigureOut">
               <a:rPr lang="en-US" smtClean="0"/>
               <a:pPr/>
-              <a:t>3/9/11</a:t>
+              <a:t>11/18/11</a:t>
             </a:fld>
             <a:endParaRPr lang="en-US"/>
           </a:p>
@@ -6036,6 +6036,82 @@
           <a:p>
             <a:pPr algn="ctr"/>
             <a:endParaRPr lang="en-US"/>
+          </a:p>
+        </p:txBody>
+      </p:sp>
+      <p:sp>
+        <p:nvSpPr>
+          <p:cNvPr id="11" name="TextBox 10"/>
+          <p:cNvSpPr txBox="1"/>
+          <p:nvPr/>
+        </p:nvSpPr>
+        <p:spPr>
+          <a:xfrm>
+            <a:off x="5502714" y="1429869"/>
+            <a:ext cx="1539003" cy="461665"/>
+          </a:xfrm>
+          <a:prstGeom prst="rect">
+            <a:avLst/>
+          </a:prstGeom>
+          <a:noFill/>
+        </p:spPr>
+        <p:txBody>
+          <a:bodyPr wrap="none" rtlCol="0">
+            <a:spAutoFit/>
+          </a:bodyPr>
+          <a:lstStyle/>
+          <a:p>
+            <a:r>
+              <a:rPr lang="en-US" sz="2400" dirty="0" smtClean="0">
+                <a:solidFill>
+                  <a:srgbClr val="C88600"/>
+                </a:solidFill>
+              </a:rPr>
+              <a:t>Body Head</a:t>
+            </a:r>
+            <a:endParaRPr lang="en-US" sz="2400" dirty="0">
+              <a:solidFill>
+                <a:srgbClr val="C88600"/>
+              </a:solidFill>
+            </a:endParaRPr>
+          </a:p>
+        </p:txBody>
+      </p:sp>
+      <p:sp>
+        <p:nvSpPr>
+          <p:cNvPr id="12" name="TextBox 11"/>
+          <p:cNvSpPr txBox="1"/>
+          <p:nvPr/>
+        </p:nvSpPr>
+        <p:spPr>
+          <a:xfrm>
+            <a:off x="550227" y="1846165"/>
+            <a:ext cx="1226743" cy="400110"/>
+          </a:xfrm>
+          <a:prstGeom prst="rect">
+            <a:avLst/>
+          </a:prstGeom>
+          <a:noFill/>
+        </p:spPr>
+        <p:txBody>
+          <a:bodyPr wrap="none" rtlCol="0">
+            <a:spAutoFit/>
+          </a:bodyPr>
+          <a:lstStyle/>
+          <a:p>
+            <a:r>
+              <a:rPr lang="en-US" sz="2000" dirty="0" smtClean="0">
+                <a:solidFill>
+                  <a:srgbClr val="F6C158"/>
+                </a:solidFill>
+              </a:rPr>
+              <a:t>Side Head</a:t>
+            </a:r>
+            <a:endParaRPr lang="en-US" sz="2000" dirty="0">
+              <a:solidFill>
+                <a:srgbClr val="F6C158"/>
+              </a:solidFill>
+            </a:endParaRPr>
           </a:p>
         </p:txBody>
       </p:sp>

</xml_diff>